<commit_message>
edit euclidian.pptx & pulverizer.pptx
</commit_message>
<xml_diff>
--- a/spring12/slidesS12/pulverizer.pptx
+++ b/spring12/slidesS12/pulverizer.pptx
@@ -5,22 +5,24 @@
     <p:sldMasterId id="2147483650" r:id="rId1"/>
   </p:sldMasterIdLst>
   <p:notesMasterIdLst>
-    <p:notesMasterId r:id="rId7"/>
+    <p:notesMasterId r:id="rId9"/>
   </p:notesMasterIdLst>
   <p:handoutMasterIdLst>
-    <p:handoutMasterId r:id="rId8"/>
+    <p:handoutMasterId r:id="rId10"/>
   </p:handoutMasterIdLst>
   <p:sldIdLst>
     <p:sldId id="728" r:id="rId2"/>
-    <p:sldId id="876" r:id="rId3"/>
-    <p:sldId id="898" r:id="rId4"/>
-    <p:sldId id="899" r:id="rId5"/>
-    <p:sldId id="880" r:id="rId6"/>
+    <p:sldId id="900" r:id="rId3"/>
+    <p:sldId id="901" r:id="rId4"/>
+    <p:sldId id="876" r:id="rId5"/>
+    <p:sldId id="898" r:id="rId6"/>
+    <p:sldId id="899" r:id="rId7"/>
+    <p:sldId id="880" r:id="rId8"/>
   </p:sldIdLst>
   <p:sldSz cx="9144000" cy="6858000" type="screen4x3"/>
   <p:notesSz cx="9601200" cy="7315200"/>
   <p:custDataLst>
-    <p:tags r:id="rId10"/>
+    <p:tags r:id="rId12"/>
   </p:custDataLst>
   <p:defaultTextStyle>
     <a:defPPr>
@@ -955,6 +957,194 @@
       </p:grpSpPr>
       <p:sp>
         <p:nvSpPr>
+          <p:cNvPr id="58370" name="Rectangle 7"/>
+          <p:cNvSpPr>
+            <a:spLocks noGrp="1" noChangeArrowheads="1"/>
+          </p:cNvSpPr>
+          <p:nvPr>
+            <p:ph type="sldNum" sz="quarter" idx="5"/>
+          </p:nvPr>
+        </p:nvSpPr>
+        <p:spPr>
+          <a:noFill/>
+        </p:spPr>
+        <p:txBody>
+          <a:bodyPr/>
+          <a:lstStyle/>
+          <a:p>
+            <a:fld id="{EC6E0C1E-AC63-4272-81A8-7644E1FADA8A}" type="slidenum">
+              <a:rPr lang="en-US" smtClean="0">
+                <a:latin typeface="Times New Roman" pitchFamily="8" charset="0"/>
+              </a:rPr>
+              <a:pPr/>
+              <a:t>2</a:t>
+            </a:fld>
+            <a:endParaRPr lang="en-US" smtClean="0">
+              <a:latin typeface="Times New Roman" pitchFamily="8" charset="0"/>
+            </a:endParaRPr>
+          </a:p>
+        </p:txBody>
+      </p:sp>
+      <p:sp>
+        <p:nvSpPr>
+          <p:cNvPr id="58371" name="Rectangle 2"/>
+          <p:cNvSpPr>
+            <a:spLocks noGrp="1" noRot="1" noChangeAspect="1" noChangeArrowheads="1" noTextEdit="1"/>
+          </p:cNvSpPr>
+          <p:nvPr>
+            <p:ph type="sldImg"/>
+          </p:nvPr>
+        </p:nvSpPr>
+        <p:spPr>
+          <a:ln/>
+        </p:spPr>
+      </p:sp>
+      <p:sp>
+        <p:nvSpPr>
+          <p:cNvPr id="58372" name="Rectangle 3"/>
+          <p:cNvSpPr>
+            <a:spLocks noGrp="1" noChangeArrowheads="1"/>
+          </p:cNvSpPr>
+          <p:nvPr>
+            <p:ph type="body" idx="1"/>
+          </p:nvPr>
+        </p:nvSpPr>
+        <p:spPr>
+          <a:noFill/>
+          <a:ln/>
+        </p:spPr>
+        <p:txBody>
+          <a:bodyPr/>
+          <a:lstStyle/>
+          <a:p>
+            <a:pPr eaLnBrk="1" hangingPunct="1"/>
+            <a:endParaRPr lang="en-US" smtClean="0">
+              <a:latin typeface="Times New Roman" pitchFamily="8" charset="0"/>
+            </a:endParaRPr>
+          </a:p>
+        </p:txBody>
+      </p:sp>
+    </p:spTree>
+  </p:cSld>
+  <p:clrMapOvr>
+    <a:masterClrMapping/>
+  </p:clrMapOvr>
+</p:notes>
+</file>
+
+<file path=ppt/notesSlides/notesSlide3.xml><?xml version="1.0" encoding="utf-8"?>
+<p:notes xmlns:a="http://schemas.openxmlformats.org/drawingml/2006/main" xmlns:r="http://schemas.openxmlformats.org/officeDocument/2006/relationships" xmlns:p="http://schemas.openxmlformats.org/presentationml/2006/main">
+  <p:cSld>
+    <p:spTree>
+      <p:nvGrpSpPr>
+        <p:cNvPr id="1" name=""/>
+        <p:cNvGrpSpPr/>
+        <p:nvPr/>
+      </p:nvGrpSpPr>
+      <p:grpSpPr>
+        <a:xfrm>
+          <a:off x="0" y="0"/>
+          <a:ext cx="0" cy="0"/>
+          <a:chOff x="0" y="0"/>
+          <a:chExt cx="0" cy="0"/>
+        </a:xfrm>
+      </p:grpSpPr>
+      <p:sp>
+        <p:nvSpPr>
+          <p:cNvPr id="58370" name="Rectangle 7"/>
+          <p:cNvSpPr>
+            <a:spLocks noGrp="1" noChangeArrowheads="1"/>
+          </p:cNvSpPr>
+          <p:nvPr>
+            <p:ph type="sldNum" sz="quarter" idx="5"/>
+          </p:nvPr>
+        </p:nvSpPr>
+        <p:spPr>
+          <a:noFill/>
+        </p:spPr>
+        <p:txBody>
+          <a:bodyPr/>
+          <a:lstStyle/>
+          <a:p>
+            <a:fld id="{EC6E0C1E-AC63-4272-81A8-7644E1FADA8A}" type="slidenum">
+              <a:rPr lang="en-US" smtClean="0">
+                <a:latin typeface="Times New Roman" pitchFamily="8" charset="0"/>
+              </a:rPr>
+              <a:pPr/>
+              <a:t>3</a:t>
+            </a:fld>
+            <a:endParaRPr lang="en-US" smtClean="0">
+              <a:latin typeface="Times New Roman" pitchFamily="8" charset="0"/>
+            </a:endParaRPr>
+          </a:p>
+        </p:txBody>
+      </p:sp>
+      <p:sp>
+        <p:nvSpPr>
+          <p:cNvPr id="58371" name="Rectangle 2"/>
+          <p:cNvSpPr>
+            <a:spLocks noGrp="1" noRot="1" noChangeAspect="1" noChangeArrowheads="1" noTextEdit="1"/>
+          </p:cNvSpPr>
+          <p:nvPr>
+            <p:ph type="sldImg"/>
+          </p:nvPr>
+        </p:nvSpPr>
+        <p:spPr>
+          <a:ln/>
+        </p:spPr>
+      </p:sp>
+      <p:sp>
+        <p:nvSpPr>
+          <p:cNvPr id="58372" name="Rectangle 3"/>
+          <p:cNvSpPr>
+            <a:spLocks noGrp="1" noChangeArrowheads="1"/>
+          </p:cNvSpPr>
+          <p:nvPr>
+            <p:ph type="body" idx="1"/>
+          </p:nvPr>
+        </p:nvSpPr>
+        <p:spPr>
+          <a:noFill/>
+          <a:ln/>
+        </p:spPr>
+        <p:txBody>
+          <a:bodyPr/>
+          <a:lstStyle/>
+          <a:p>
+            <a:pPr eaLnBrk="1" hangingPunct="1"/>
+            <a:endParaRPr lang="en-US" smtClean="0">
+              <a:latin typeface="Times New Roman" pitchFamily="8" charset="0"/>
+            </a:endParaRPr>
+          </a:p>
+        </p:txBody>
+      </p:sp>
+    </p:spTree>
+  </p:cSld>
+  <p:clrMapOvr>
+    <a:masterClrMapping/>
+  </p:clrMapOvr>
+</p:notes>
+</file>
+
+<file path=ppt/notesSlides/notesSlide4.xml><?xml version="1.0" encoding="utf-8"?>
+<p:notes xmlns:a="http://schemas.openxmlformats.org/drawingml/2006/main" xmlns:r="http://schemas.openxmlformats.org/officeDocument/2006/relationships" xmlns:p="http://schemas.openxmlformats.org/presentationml/2006/main">
+  <p:cSld>
+    <p:spTree>
+      <p:nvGrpSpPr>
+        <p:cNvPr id="1" name=""/>
+        <p:cNvGrpSpPr/>
+        <p:nvPr/>
+      </p:nvGrpSpPr>
+      <p:grpSpPr>
+        <a:xfrm>
+          <a:off x="0" y="0"/>
+          <a:ext cx="0" cy="0"/>
+          <a:chOff x="0" y="0"/>
+          <a:chExt cx="0" cy="0"/>
+        </a:xfrm>
+      </p:grpSpPr>
+      <p:sp>
+        <p:nvSpPr>
           <p:cNvPr id="64514" name="Rectangle 7"/>
           <p:cNvSpPr>
             <a:spLocks noGrp="1" noChangeArrowheads="1"/>
@@ -975,7 +1165,7 @@
                 <a:latin typeface="Times New Roman" pitchFamily="8" charset="0"/>
               </a:rPr>
               <a:pPr/>
-              <a:t>2</a:t>
+              <a:t>4</a:t>
             </a:fld>
             <a:endParaRPr lang="en-US" smtClean="0">
               <a:latin typeface="Times New Roman" pitchFamily="8" charset="0"/>
@@ -1030,7 +1220,7 @@
 </p:notes>
 </file>
 
-<file path=ppt/notesSlides/notesSlide3.xml><?xml version="1.0" encoding="utf-8"?>
+<file path=ppt/notesSlides/notesSlide5.xml><?xml version="1.0" encoding="utf-8"?>
 <p:notes xmlns:a="http://schemas.openxmlformats.org/drawingml/2006/main" xmlns:r="http://schemas.openxmlformats.org/officeDocument/2006/relationships" xmlns:p="http://schemas.openxmlformats.org/presentationml/2006/main">
   <p:cSld>
     <p:spTree>
@@ -1069,7 +1259,7 @@
                 <a:latin typeface="Times New Roman" pitchFamily="8" charset="0"/>
               </a:rPr>
               <a:pPr/>
-              <a:t>3</a:t>
+              <a:t>5</a:t>
             </a:fld>
             <a:endParaRPr lang="en-US" smtClean="0">
               <a:latin typeface="Times New Roman" pitchFamily="8" charset="0"/>
@@ -1124,7 +1314,7 @@
 </p:notes>
 </file>
 
-<file path=ppt/notesSlides/notesSlide4.xml><?xml version="1.0" encoding="utf-8"?>
+<file path=ppt/notesSlides/notesSlide6.xml><?xml version="1.0" encoding="utf-8"?>
 <p:notes xmlns:a="http://schemas.openxmlformats.org/drawingml/2006/main" xmlns:r="http://schemas.openxmlformats.org/officeDocument/2006/relationships" xmlns:p="http://schemas.openxmlformats.org/presentationml/2006/main">
   <p:cSld>
     <p:spTree>
@@ -1163,7 +1353,7 @@
                 <a:latin typeface="Times New Roman" pitchFamily="8" charset="0"/>
               </a:rPr>
               <a:pPr/>
-              <a:t>4</a:t>
+              <a:t>6</a:t>
             </a:fld>
             <a:endParaRPr lang="en-US" smtClean="0">
               <a:latin typeface="Times New Roman" pitchFamily="8" charset="0"/>
@@ -1218,7 +1408,7 @@
 </p:notes>
 </file>
 
-<file path=ppt/notesSlides/notesSlide5.xml><?xml version="1.0" encoding="utf-8"?>
+<file path=ppt/notesSlides/notesSlide7.xml><?xml version="1.0" encoding="utf-8"?>
 <p:notes xmlns:a="http://schemas.openxmlformats.org/drawingml/2006/main" xmlns:r="http://schemas.openxmlformats.org/officeDocument/2006/relationships" xmlns:p="http://schemas.openxmlformats.org/presentationml/2006/main">
   <p:cSld>
     <p:spTree>
@@ -1257,7 +1447,7 @@
                 <a:latin typeface="Times New Roman" pitchFamily="8" charset="0"/>
               </a:rPr>
               <a:pPr/>
-              <a:t>5</a:t>
+              <a:t>7</a:t>
             </a:fld>
             <a:endParaRPr lang="en-US" smtClean="0">
               <a:latin typeface="Times New Roman" pitchFamily="8" charset="0"/>
@@ -2745,6 +2935,784 @@
       </p:grpSpPr>
       <p:sp>
         <p:nvSpPr>
+          <p:cNvPr id="24578" name="Rectangle 2"/>
+          <p:cNvSpPr>
+            <a:spLocks noGrp="1" noChangeArrowheads="1"/>
+          </p:cNvSpPr>
+          <p:nvPr>
+            <p:ph type="title"/>
+          </p:nvPr>
+        </p:nvSpPr>
+        <p:spPr/>
+        <p:txBody>
+          <a:bodyPr/>
+          <a:lstStyle/>
+          <a:p>
+            <a:pPr eaLnBrk="1" hangingPunct="1"/>
+            <a:r>
+              <a:rPr lang="en-US" smtClean="0"/>
+              <a:t>GCD is a linear combination</a:t>
+            </a:r>
+          </a:p>
+        </p:txBody>
+      </p:sp>
+      <p:sp>
+        <p:nvSpPr>
+          <p:cNvPr id="24579" name="Rectangle 3"/>
+          <p:cNvSpPr>
+            <a:spLocks noGrp="1" noChangeArrowheads="1"/>
+          </p:cNvSpPr>
+          <p:nvPr>
+            <p:ph type="body" idx="1"/>
+          </p:nvPr>
+        </p:nvSpPr>
+        <p:spPr>
+          <a:xfrm>
+            <a:off x="152400" y="1524000"/>
+            <a:ext cx="8458200" cy="3810000"/>
+          </a:xfrm>
+        </p:spPr>
+        <p:txBody>
+          <a:bodyPr/>
+          <a:lstStyle/>
+          <a:p>
+            <a:pPr marL="0" indent="0" eaLnBrk="1" hangingPunct="1">
+              <a:buFontTx/>
+              <a:buNone/>
+            </a:pPr>
+            <a:r>
+              <a:rPr lang="en-US" sz="5400" b="1" dirty="0" smtClean="0"/>
+              <a:t>Theorem:</a:t>
+            </a:r>
+            <a:endParaRPr lang="en-US" sz="5400" dirty="0" smtClean="0"/>
+          </a:p>
+          <a:p>
+            <a:pPr marL="0" indent="0" eaLnBrk="1" hangingPunct="1">
+              <a:spcBef>
+                <a:spcPts val="0"/>
+              </a:spcBef>
+              <a:buFontTx/>
+              <a:buNone/>
+            </a:pPr>
+            <a:r>
+              <a:rPr lang="en-US" sz="6000" dirty="0" smtClean="0">
+                <a:solidFill>
+                  <a:srgbClr val="0000CC"/>
+                </a:solidFill>
+              </a:rPr>
+              <a:t>   </a:t>
+            </a:r>
+            <a:r>
+              <a:rPr lang="en-US" sz="6000" dirty="0" err="1" smtClean="0">
+                <a:solidFill>
+                  <a:srgbClr val="0000CC"/>
+                </a:solidFill>
+              </a:rPr>
+              <a:t>gcd</a:t>
+            </a:r>
+            <a:r>
+              <a:rPr lang="en-US" sz="6000" dirty="0" smtClean="0">
+                <a:solidFill>
+                  <a:srgbClr val="0000CC"/>
+                </a:solidFill>
+              </a:rPr>
+              <a:t>(</a:t>
+            </a:r>
+            <a:r>
+              <a:rPr lang="en-US" sz="6000" dirty="0" err="1" smtClean="0">
+                <a:solidFill>
+                  <a:srgbClr val="0000CC"/>
+                </a:solidFill>
+              </a:rPr>
+              <a:t>a,b</a:t>
+            </a:r>
+            <a:r>
+              <a:rPr lang="en-US" sz="6000" dirty="0" smtClean="0">
+                <a:solidFill>
+                  <a:srgbClr val="0000CC"/>
+                </a:solidFill>
+              </a:rPr>
+              <a:t>) </a:t>
+            </a:r>
+            <a:r>
+              <a:rPr lang="en-US" sz="6000" dirty="0" smtClean="0"/>
+              <a:t>is an integer </a:t>
+            </a:r>
+          </a:p>
+          <a:p>
+            <a:pPr marL="0" indent="0" eaLnBrk="1" hangingPunct="1">
+              <a:spcBef>
+                <a:spcPts val="0"/>
+              </a:spcBef>
+              <a:buFontTx/>
+              <a:buNone/>
+            </a:pPr>
+            <a:r>
+              <a:rPr lang="en-US" sz="6000" dirty="0" smtClean="0"/>
+              <a:t>   linear combination of</a:t>
+            </a:r>
+          </a:p>
+          <a:p>
+            <a:pPr marL="0" indent="0" eaLnBrk="1" hangingPunct="1">
+              <a:spcBef>
+                <a:spcPts val="0"/>
+              </a:spcBef>
+              <a:buFontTx/>
+              <a:buNone/>
+            </a:pPr>
+            <a:r>
+              <a:rPr lang="en-US" sz="6000" dirty="0" smtClean="0">
+                <a:solidFill>
+                  <a:srgbClr val="0000CC"/>
+                </a:solidFill>
+              </a:rPr>
+              <a:t>   a</a:t>
+            </a:r>
+            <a:r>
+              <a:rPr lang="en-US" sz="6000" i="1" dirty="0" smtClean="0">
+                <a:solidFill>
+                  <a:srgbClr val="0000CC"/>
+                </a:solidFill>
+              </a:rPr>
+              <a:t> </a:t>
+            </a:r>
+            <a:r>
+              <a:rPr lang="en-US" sz="6000" dirty="0" smtClean="0"/>
+              <a:t>and</a:t>
+            </a:r>
+            <a:r>
+              <a:rPr lang="en-US" sz="6000" i="1" dirty="0" smtClean="0">
+                <a:solidFill>
+                  <a:srgbClr val="0000CC"/>
+                </a:solidFill>
+              </a:rPr>
+              <a:t> </a:t>
+            </a:r>
+            <a:r>
+              <a:rPr lang="en-US" sz="6000" dirty="0" smtClean="0">
+                <a:solidFill>
+                  <a:srgbClr val="0000CC"/>
+                </a:solidFill>
+              </a:rPr>
+              <a:t>b</a:t>
+            </a:r>
+            <a:r>
+              <a:rPr lang="en-US" sz="6000" i="1" dirty="0" smtClean="0"/>
+              <a:t>.</a:t>
+            </a:r>
+            <a:endParaRPr lang="en-US" sz="6000" dirty="0" smtClean="0"/>
+          </a:p>
+        </p:txBody>
+      </p:sp>
+      <p:sp>
+        <p:nvSpPr>
+          <p:cNvPr id="24582" name="Slide Number Placeholder 3"/>
+          <p:cNvSpPr>
+            <a:spLocks noGrp="1"/>
+          </p:cNvSpPr>
+          <p:nvPr>
+            <p:ph type="sldNum" sz="quarter" idx="10"/>
+          </p:nvPr>
+        </p:nvSpPr>
+        <p:spPr>
+          <a:noFill/>
+        </p:spPr>
+        <p:txBody>
+          <a:bodyPr/>
+          <a:lstStyle/>
+          <a:p>
+            <a:r>
+              <a:rPr lang="en-US" dirty="0" err="1" smtClean="0">
+                <a:latin typeface="Comic Sans MS" pitchFamily="8" charset="0"/>
+              </a:rPr>
+              <a:t>lec</a:t>
+            </a:r>
+            <a:r>
+              <a:rPr lang="en-US" dirty="0" smtClean="0">
+                <a:latin typeface="Comic Sans MS" pitchFamily="8" charset="0"/>
+              </a:rPr>
+              <a:t> 5M.</a:t>
+            </a:r>
+            <a:fld id="{CCB45DB7-2069-4CDB-95A9-C4EF498CA91E}" type="slidenum">
+              <a:rPr lang="en-US" sz="1200" smtClean="0">
+                <a:latin typeface="Comic Sans MS" pitchFamily="8" charset="0"/>
+              </a:rPr>
+              <a:pPr/>
+              <a:t>2</a:t>
+            </a:fld>
+            <a:endParaRPr lang="en-US" sz="1200" dirty="0" smtClean="0">
+              <a:latin typeface="Comic Sans MS" pitchFamily="8" charset="0"/>
+            </a:endParaRPr>
+          </a:p>
+        </p:txBody>
+      </p:sp>
+    </p:spTree>
+    <p:extLst>
+      <p:ext uri="{BB962C8B-B14F-4D97-AF65-F5344CB8AC3E}">
+        <p14:creationId xmlns:p14="http://schemas.microsoft.com/office/powerpoint/2010/main" val="879848424"/>
+      </p:ext>
+    </p:extLst>
+  </p:cSld>
+  <p:clrMapOvr>
+    <a:masterClrMapping/>
+  </p:clrMapOvr>
+  <mc:AlternateContent xmlns:mc="http://schemas.openxmlformats.org/markup-compatibility/2006" xmlns:p14="http://schemas.microsoft.com/office/powerpoint/2010/main">
+    <mc:Choice Requires="p14">
+      <p:transition spd="slow" p14:dur="1200">
+        <p:fade thruBlk="1"/>
+      </p:transition>
+    </mc:Choice>
+    <mc:Fallback xmlns="">
+      <p:transition xmlns:p14="http://schemas.microsoft.com/office/powerpoint/2010/main" spd="slow">
+        <p:fade thruBlk="1"/>
+      </p:transition>
+    </mc:Fallback>
+  </mc:AlternateContent>
+  <p:timing>
+    <p:tnLst>
+      <p:par>
+        <p:cTn xmlns:p14="http://schemas.microsoft.com/office/powerpoint/2010/main" id="1" dur="indefinite" restart="never" nodeType="tmRoot"/>
+      </p:par>
+    </p:tnLst>
+  </p:timing>
+</p:sld>
+</file>
+
+<file path=ppt/slides/slide3.xml><?xml version="1.0" encoding="utf-8"?>
+<p:sld xmlns:a="http://schemas.openxmlformats.org/drawingml/2006/main" xmlns:r="http://schemas.openxmlformats.org/officeDocument/2006/relationships" xmlns:p="http://schemas.openxmlformats.org/presentationml/2006/main">
+  <p:cSld>
+    <p:spTree>
+      <p:nvGrpSpPr>
+        <p:cNvPr id="1" name=""/>
+        <p:cNvGrpSpPr/>
+        <p:nvPr/>
+      </p:nvGrpSpPr>
+      <p:grpSpPr>
+        <a:xfrm>
+          <a:off x="0" y="0"/>
+          <a:ext cx="0" cy="0"/>
+          <a:chOff x="0" y="0"/>
+          <a:chExt cx="0" cy="0"/>
+        </a:xfrm>
+      </p:grpSpPr>
+      <p:sp>
+        <p:nvSpPr>
+          <p:cNvPr id="24578" name="Rectangle 2"/>
+          <p:cNvSpPr>
+            <a:spLocks noGrp="1" noChangeArrowheads="1"/>
+          </p:cNvSpPr>
+          <p:nvPr>
+            <p:ph type="title"/>
+          </p:nvPr>
+        </p:nvSpPr>
+        <p:spPr/>
+        <p:txBody>
+          <a:bodyPr/>
+          <a:lstStyle/>
+          <a:p>
+            <a:pPr eaLnBrk="1" hangingPunct="1"/>
+            <a:r>
+              <a:rPr lang="en-US" smtClean="0"/>
+              <a:t>GCD is a linear combination</a:t>
+            </a:r>
+          </a:p>
+        </p:txBody>
+      </p:sp>
+      <p:sp>
+        <p:nvSpPr>
+          <p:cNvPr id="24579" name="Rectangle 3"/>
+          <p:cNvSpPr>
+            <a:spLocks noGrp="1" noChangeArrowheads="1"/>
+          </p:cNvSpPr>
+          <p:nvPr>
+            <p:ph type="body" idx="1"/>
+          </p:nvPr>
+        </p:nvSpPr>
+        <p:spPr>
+          <a:xfrm>
+            <a:off x="76200" y="1447800"/>
+            <a:ext cx="9067800" cy="3962400"/>
+          </a:xfrm>
+        </p:spPr>
+        <p:txBody>
+          <a:bodyPr/>
+          <a:lstStyle/>
+          <a:p>
+            <a:pPr marL="0" indent="0" eaLnBrk="1" hangingPunct="1">
+              <a:buFontTx/>
+              <a:buNone/>
+            </a:pPr>
+            <a:r>
+              <a:rPr lang="en-US" sz="5400" b="1" dirty="0" smtClean="0"/>
+              <a:t>Corollary:</a:t>
+            </a:r>
+            <a:endParaRPr lang="en-US" sz="5400" dirty="0" smtClean="0"/>
+          </a:p>
+          <a:p>
+            <a:pPr marL="0" indent="0" eaLnBrk="1" hangingPunct="1">
+              <a:spcBef>
+                <a:spcPts val="0"/>
+              </a:spcBef>
+              <a:buFontTx/>
+              <a:buNone/>
+            </a:pPr>
+            <a:r>
+              <a:rPr lang="en-US" sz="6000" dirty="0" smtClean="0">
+                <a:solidFill>
+                  <a:srgbClr val="000000"/>
+                </a:solidFill>
+              </a:rPr>
+              <a:t>The</a:t>
+            </a:r>
+            <a:r>
+              <a:rPr lang="en-US" sz="6000" dirty="0" smtClean="0">
+                <a:solidFill>
+                  <a:srgbClr val="0000CC"/>
+                </a:solidFill>
+              </a:rPr>
+              <a:t> multiples </a:t>
+            </a:r>
+            <a:r>
+              <a:rPr lang="en-US" sz="6000" dirty="0" smtClean="0">
+                <a:solidFill>
+                  <a:srgbClr val="000000"/>
+                </a:solidFill>
+              </a:rPr>
+              <a:t>of</a:t>
+            </a:r>
+            <a:r>
+              <a:rPr lang="en-US" sz="6000" dirty="0" smtClean="0">
+                <a:solidFill>
+                  <a:srgbClr val="0000CC"/>
+                </a:solidFill>
+              </a:rPr>
+              <a:t> </a:t>
+            </a:r>
+            <a:r>
+              <a:rPr lang="en-US" sz="6000" dirty="0" err="1" smtClean="0">
+                <a:solidFill>
+                  <a:srgbClr val="0000CC"/>
+                </a:solidFill>
+              </a:rPr>
+              <a:t>gcd</a:t>
+            </a:r>
+            <a:r>
+              <a:rPr lang="en-US" sz="6000" dirty="0" smtClean="0">
+                <a:solidFill>
+                  <a:srgbClr val="0000CC"/>
+                </a:solidFill>
+              </a:rPr>
+              <a:t>(</a:t>
+            </a:r>
+            <a:r>
+              <a:rPr lang="en-US" sz="6000" dirty="0" err="1" smtClean="0">
+                <a:solidFill>
+                  <a:srgbClr val="0000CC"/>
+                </a:solidFill>
+              </a:rPr>
+              <a:t>a,b</a:t>
+            </a:r>
+            <a:r>
+              <a:rPr lang="en-US" sz="6000" dirty="0" smtClean="0">
+                <a:solidFill>
+                  <a:srgbClr val="0000CC"/>
+                </a:solidFill>
+              </a:rPr>
+              <a:t>) </a:t>
+            </a:r>
+            <a:r>
+              <a:rPr lang="en-US" sz="6000" dirty="0" smtClean="0"/>
+              <a:t>are </a:t>
+            </a:r>
+            <a:r>
+              <a:rPr lang="en-US" sz="6000" dirty="0" smtClean="0">
+                <a:solidFill>
+                  <a:srgbClr val="CB10A8"/>
+                </a:solidFill>
+              </a:rPr>
+              <a:t>exactly</a:t>
+            </a:r>
+            <a:r>
+              <a:rPr lang="en-US" sz="6000" dirty="0" smtClean="0"/>
+              <a:t> the </a:t>
+            </a:r>
+            <a:r>
+              <a:rPr lang="en-US" sz="6000" dirty="0" smtClean="0">
+                <a:solidFill>
+                  <a:schemeClr val="accent1">
+                    <a:lumMod val="50000"/>
+                  </a:schemeClr>
+                </a:solidFill>
+              </a:rPr>
+              <a:t>linear combinations</a:t>
+            </a:r>
+            <a:r>
+              <a:rPr lang="en-US" sz="6000" dirty="0" smtClean="0"/>
+              <a:t> of</a:t>
+            </a:r>
+            <a:r>
+              <a:rPr lang="en-US" sz="6000" dirty="0" smtClean="0">
+                <a:solidFill>
+                  <a:srgbClr val="0000CC"/>
+                </a:solidFill>
+              </a:rPr>
+              <a:t> a</a:t>
+            </a:r>
+            <a:r>
+              <a:rPr lang="en-US" sz="6000" i="1" dirty="0" smtClean="0">
+                <a:solidFill>
+                  <a:srgbClr val="0000CC"/>
+                </a:solidFill>
+              </a:rPr>
+              <a:t> </a:t>
+            </a:r>
+            <a:r>
+              <a:rPr lang="en-US" sz="6000" dirty="0" smtClean="0"/>
+              <a:t>and</a:t>
+            </a:r>
+            <a:r>
+              <a:rPr lang="en-US" sz="6000" i="1" dirty="0" smtClean="0">
+                <a:solidFill>
+                  <a:srgbClr val="0000CC"/>
+                </a:solidFill>
+              </a:rPr>
+              <a:t> </a:t>
+            </a:r>
+            <a:r>
+              <a:rPr lang="en-US" sz="6000" dirty="0" smtClean="0">
+                <a:solidFill>
+                  <a:srgbClr val="0000CC"/>
+                </a:solidFill>
+              </a:rPr>
+              <a:t>b</a:t>
+            </a:r>
+            <a:r>
+              <a:rPr lang="en-US" sz="6000" i="1" dirty="0" smtClean="0"/>
+              <a:t>.</a:t>
+            </a:r>
+            <a:endParaRPr lang="en-US" sz="6000" dirty="0" smtClean="0"/>
+          </a:p>
+        </p:txBody>
+      </p:sp>
+      <p:sp>
+        <p:nvSpPr>
+          <p:cNvPr id="24582" name="Slide Number Placeholder 3"/>
+          <p:cNvSpPr>
+            <a:spLocks noGrp="1"/>
+          </p:cNvSpPr>
+          <p:nvPr>
+            <p:ph type="sldNum" sz="quarter" idx="10"/>
+          </p:nvPr>
+        </p:nvSpPr>
+        <p:spPr>
+          <a:noFill/>
+        </p:spPr>
+        <p:txBody>
+          <a:bodyPr/>
+          <a:lstStyle/>
+          <a:p>
+            <a:r>
+              <a:rPr lang="en-US" dirty="0" err="1" smtClean="0">
+                <a:latin typeface="Comic Sans MS" pitchFamily="8" charset="0"/>
+              </a:rPr>
+              <a:t>lec</a:t>
+            </a:r>
+            <a:r>
+              <a:rPr lang="en-US" dirty="0" smtClean="0">
+                <a:latin typeface="Comic Sans MS" pitchFamily="8" charset="0"/>
+              </a:rPr>
+              <a:t> 5M.</a:t>
+            </a:r>
+            <a:fld id="{CCB45DB7-2069-4CDB-95A9-C4EF498CA91E}" type="slidenum">
+              <a:rPr lang="en-US" sz="1200" smtClean="0">
+                <a:latin typeface="Comic Sans MS" pitchFamily="8" charset="0"/>
+              </a:rPr>
+              <a:pPr/>
+              <a:t>3</a:t>
+            </a:fld>
+            <a:endParaRPr lang="en-US" sz="1200" dirty="0" smtClean="0">
+              <a:latin typeface="Comic Sans MS" pitchFamily="8" charset="0"/>
+            </a:endParaRPr>
+          </a:p>
+        </p:txBody>
+      </p:sp>
+      <p:sp>
+        <p:nvSpPr>
+          <p:cNvPr id="2" name="Rectangle 1"/>
+          <p:cNvSpPr/>
+          <p:nvPr/>
+        </p:nvSpPr>
+        <p:spPr bwMode="auto">
+          <a:xfrm>
+            <a:off x="76200" y="2362200"/>
+            <a:ext cx="8991600" cy="2895600"/>
+          </a:xfrm>
+          <a:prstGeom prst="rect">
+            <a:avLst/>
+          </a:prstGeom>
+          <a:noFill/>
+          <a:ln w="50800" cap="flat" cmpd="sng" algn="ctr">
+            <a:solidFill>
+              <a:srgbClr val="FF00FF"/>
+            </a:solidFill>
+            <a:prstDash val="sysDash"/>
+            <a:round/>
+            <a:headEnd type="none" w="med" len="med"/>
+            <a:tailEnd type="none" w="lg" len="lg"/>
+          </a:ln>
+          <a:effectLst/>
+        </p:spPr>
+        <p:txBody>
+          <a:bodyPr vert="horz" wrap="square" lIns="91440" tIns="45720" rIns="91440" bIns="45720" numCol="1" rtlCol="0" anchor="t" anchorCtr="0" compatLnSpc="1">
+            <a:prstTxWarp prst="textNoShape">
+              <a:avLst/>
+            </a:prstTxWarp>
+          </a:bodyPr>
+          <a:lstStyle/>
+          <a:p>
+            <a:pPr marL="0" marR="0" indent="0" algn="l" defTabSz="914400" rtl="0" eaLnBrk="1" fontAlgn="base" latinLnBrk="0" hangingPunct="1">
+              <a:lnSpc>
+                <a:spcPct val="100000"/>
+              </a:lnSpc>
+              <a:spcBef>
+                <a:spcPct val="0"/>
+              </a:spcBef>
+              <a:spcAft>
+                <a:spcPct val="0"/>
+              </a:spcAft>
+              <a:buClrTx/>
+              <a:buSzTx/>
+              <a:buFontTx/>
+              <a:buNone/>
+              <a:tabLst/>
+            </a:pPr>
+            <a:endParaRPr kumimoji="0" lang="en-US" sz="4000" b="0" i="0" u="none" strike="noStrike" cap="none" normalizeH="0" baseline="0" smtClean="0">
+              <a:ln>
+                <a:noFill/>
+              </a:ln>
+              <a:solidFill>
+                <a:schemeClr val="tx1"/>
+              </a:solidFill>
+              <a:effectLst/>
+              <a:latin typeface="Comic Sans MS" pitchFamily="66" charset="0"/>
+            </a:endParaRPr>
+          </a:p>
+        </p:txBody>
+      </p:sp>
+    </p:spTree>
+    <p:extLst>
+      <p:ext uri="{BB962C8B-B14F-4D97-AF65-F5344CB8AC3E}">
+        <p14:creationId xmlns:p14="http://schemas.microsoft.com/office/powerpoint/2010/main" val="4215400260"/>
+      </p:ext>
+    </p:extLst>
+  </p:cSld>
+  <p:clrMapOvr>
+    <a:masterClrMapping/>
+  </p:clrMapOvr>
+  <mc:AlternateContent xmlns:mc="http://schemas.openxmlformats.org/markup-compatibility/2006" xmlns:p14="http://schemas.microsoft.com/office/powerpoint/2010/main">
+    <mc:Choice Requires="p14">
+      <p:transition spd="med" p14:dur="700">
+        <p:fade/>
+      </p:transition>
+    </mc:Choice>
+    <mc:Fallback xmlns="">
+      <p:transition xmlns:p14="http://schemas.microsoft.com/office/powerpoint/2010/main" spd="med">
+        <p:fade/>
+      </p:transition>
+    </mc:Fallback>
+  </mc:AlternateContent>
+  <p:timing>
+    <p:tnLst>
+      <p:par>
+        <p:cTn xmlns:p14="http://schemas.microsoft.com/office/powerpoint/2010/main" id="1" dur="indefinite" restart="never" nodeType="tmRoot">
+          <p:childTnLst>
+            <p:seq concurrent="1" nextAc="seek">
+              <p:cTn id="2" dur="indefinite" nodeType="mainSeq">
+                <p:childTnLst>
+                  <p:par>
+                    <p:cTn id="3" fill="hold">
+                      <p:stCondLst>
+                        <p:cond delay="indefinite"/>
+                      </p:stCondLst>
+                      <p:childTnLst>
+                        <p:par>
+                          <p:cTn id="4" fill="hold">
+                            <p:stCondLst>
+                              <p:cond delay="0"/>
+                            </p:stCondLst>
+                            <p:childTnLst>
+                              <p:par>
+                                <p:cTn id="5" presetID="15" presetClass="entr" presetSubtype="0" fill="hold" grpId="1" nodeType="clickEffect">
+                                  <p:stCondLst>
+                                    <p:cond delay="0"/>
+                                  </p:stCondLst>
+                                  <p:childTnLst>
+                                    <p:set>
+                                      <p:cBhvr>
+                                        <p:cTn id="6" dur="1" fill="hold">
+                                          <p:stCondLst>
+                                            <p:cond delay="0"/>
+                                          </p:stCondLst>
+                                        </p:cTn>
+                                        <p:tgtEl>
+                                          <p:spTgt spid="2"/>
+                                        </p:tgtEl>
+                                        <p:attrNameLst>
+                                          <p:attrName>style.visibility</p:attrName>
+                                        </p:attrNameLst>
+                                      </p:cBhvr>
+                                      <p:to>
+                                        <p:strVal val="visible"/>
+                                      </p:to>
+                                    </p:set>
+                                    <p:anim calcmode="lin" valueType="num">
+                                      <p:cBhvr>
+                                        <p:cTn id="7" dur="1000" fill="hold"/>
+                                        <p:tgtEl>
+                                          <p:spTgt spid="2"/>
+                                        </p:tgtEl>
+                                        <p:attrNameLst>
+                                          <p:attrName>ppt_w</p:attrName>
+                                        </p:attrNameLst>
+                                      </p:cBhvr>
+                                      <p:tavLst>
+                                        <p:tav tm="0">
+                                          <p:val>
+                                            <p:fltVal val="0"/>
+                                          </p:val>
+                                        </p:tav>
+                                        <p:tav tm="100000">
+                                          <p:val>
+                                            <p:strVal val="#ppt_w"/>
+                                          </p:val>
+                                        </p:tav>
+                                      </p:tavLst>
+                                    </p:anim>
+                                    <p:anim calcmode="lin" valueType="num">
+                                      <p:cBhvr>
+                                        <p:cTn id="8" dur="1000" fill="hold"/>
+                                        <p:tgtEl>
+                                          <p:spTgt spid="2"/>
+                                        </p:tgtEl>
+                                        <p:attrNameLst>
+                                          <p:attrName>ppt_h</p:attrName>
+                                        </p:attrNameLst>
+                                      </p:cBhvr>
+                                      <p:tavLst>
+                                        <p:tav tm="0">
+                                          <p:val>
+                                            <p:fltVal val="0"/>
+                                          </p:val>
+                                        </p:tav>
+                                        <p:tav tm="100000">
+                                          <p:val>
+                                            <p:strVal val="#ppt_h"/>
+                                          </p:val>
+                                        </p:tav>
+                                      </p:tavLst>
+                                    </p:anim>
+                                    <p:anim calcmode="lin" valueType="num">
+                                      <p:cBhvr>
+                                        <p:cTn id="9" dur="1000" fill="hold"/>
+                                        <p:tgtEl>
+                                          <p:spTgt spid="2"/>
+                                        </p:tgtEl>
+                                        <p:attrNameLst>
+                                          <p:attrName>ppt_x</p:attrName>
+                                        </p:attrNameLst>
+                                      </p:cBhvr>
+                                      <p:tavLst>
+                                        <p:tav tm="0" fmla="#ppt_x+(cos(-2*pi*(1-$))*-#ppt_x-sin(-2*pi*(1-$))*(1-#ppt_y))*(1-$)">
+                                          <p:val>
+                                            <p:fltVal val="0"/>
+                                          </p:val>
+                                        </p:tav>
+                                        <p:tav tm="100000">
+                                          <p:val>
+                                            <p:fltVal val="1"/>
+                                          </p:val>
+                                        </p:tav>
+                                      </p:tavLst>
+                                    </p:anim>
+                                    <p:anim calcmode="lin" valueType="num">
+                                      <p:cBhvr>
+                                        <p:cTn id="10" dur="1000" fill="hold"/>
+                                        <p:tgtEl>
+                                          <p:spTgt spid="2"/>
+                                        </p:tgtEl>
+                                        <p:attrNameLst>
+                                          <p:attrName>ppt_y</p:attrName>
+                                        </p:attrNameLst>
+                                      </p:cBhvr>
+                                      <p:tavLst>
+                                        <p:tav tm="0" fmla="#ppt_y+(sin(-2*pi*(1-$))*-#ppt_x+cos(-2*pi*(1-$))*(1-#ppt_y))*(1-$)">
+                                          <p:val>
+                                            <p:fltVal val="0"/>
+                                          </p:val>
+                                        </p:tav>
+                                        <p:tav tm="100000">
+                                          <p:val>
+                                            <p:fltVal val="1"/>
+                                          </p:val>
+                                        </p:tav>
+                                      </p:tavLst>
+                                    </p:anim>
+                                  </p:childTnLst>
+                                </p:cTn>
+                              </p:par>
+                            </p:childTnLst>
+                          </p:cTn>
+                        </p:par>
+                      </p:childTnLst>
+                    </p:cTn>
+                  </p:par>
+                </p:childTnLst>
+              </p:cTn>
+              <p:prevCondLst>
+                <p:cond evt="onPrev" delay="0">
+                  <p:tgtEl>
+                    <p:sldTgt/>
+                  </p:tgtEl>
+                </p:cond>
+              </p:prevCondLst>
+              <p:nextCondLst>
+                <p:cond evt="onNext" delay="0">
+                  <p:tgtEl>
+                    <p:sldTgt/>
+                  </p:tgtEl>
+                </p:cond>
+              </p:nextCondLst>
+            </p:seq>
+          </p:childTnLst>
+        </p:cTn>
+      </p:par>
+    </p:tnLst>
+    <p:bldLst>
+      <p:bldP spid="2" grpId="1" animBg="1"/>
+    </p:bldLst>
+  </p:timing>
+</p:sld>
+</file>
+
+<file path=ppt/slides/slide4.xml><?xml version="1.0" encoding="utf-8"?>
+<p:sld xmlns:a="http://schemas.openxmlformats.org/drawingml/2006/main" xmlns:r="http://schemas.openxmlformats.org/officeDocument/2006/relationships" xmlns:p="http://schemas.openxmlformats.org/presentationml/2006/main">
+  <p:cSld>
+    <p:spTree>
+      <p:nvGrpSpPr>
+        <p:cNvPr id="1" name=""/>
+        <p:cNvGrpSpPr/>
+        <p:nvPr/>
+      </p:nvGrpSpPr>
+      <p:grpSpPr>
+        <a:xfrm>
+          <a:off x="0" y="0"/>
+          <a:ext cx="0" cy="0"/>
+          <a:chOff x="0" y="0"/>
+          <a:chExt cx="0" cy="0"/>
+        </a:xfrm>
+      </p:grpSpPr>
+      <p:sp>
+        <p:nvSpPr>
           <p:cNvPr id="29698" name="Rectangle 2"/>
           <p:cNvSpPr>
             <a:spLocks noGrp="1" noChangeArrowheads="1"/>
@@ -3001,7 +3969,7 @@
                 <a:latin typeface="Comic Sans MS" pitchFamily="8" charset="0"/>
               </a:rPr>
               <a:pPr/>
-              <a:t>2</a:t>
+              <a:t>4</a:t>
             </a:fld>
             <a:endParaRPr lang="en-US" sz="1200" dirty="0" smtClean="0">
               <a:latin typeface="Comic Sans MS" pitchFamily="8" charset="0"/>
@@ -3304,7 +4272,7 @@
 </p:sld>
 </file>
 
-<file path=ppt/slides/slide3.xml><?xml version="1.0" encoding="utf-8"?>
+<file path=ppt/slides/slide5.xml><?xml version="1.0" encoding="utf-8"?>
 <p:sld xmlns:a="http://schemas.openxmlformats.org/drawingml/2006/main" xmlns:r="http://schemas.openxmlformats.org/officeDocument/2006/relationships" xmlns:p="http://schemas.openxmlformats.org/presentationml/2006/main">
   <p:cSld>
     <p:spTree>
@@ -3532,7 +4500,7 @@
                 <a:latin typeface="Comic Sans MS" pitchFamily="8" charset="0"/>
               </a:rPr>
               <a:pPr/>
-              <a:t>3</a:t>
+              <a:t>5</a:t>
             </a:fld>
             <a:endParaRPr lang="en-US" sz="1200" dirty="0" smtClean="0">
               <a:latin typeface="Comic Sans MS" pitchFamily="8" charset="0"/>
@@ -4696,7 +5664,7 @@
 </p:sld>
 </file>
 
-<file path=ppt/slides/slide4.xml><?xml version="1.0" encoding="utf-8"?>
+<file path=ppt/slides/slide6.xml><?xml version="1.0" encoding="utf-8"?>
 <p:sld xmlns:a="http://schemas.openxmlformats.org/drawingml/2006/main" xmlns:r="http://schemas.openxmlformats.org/officeDocument/2006/relationships" xmlns:p="http://schemas.openxmlformats.org/presentationml/2006/main">
   <p:cSld>
     <p:spTree>
@@ -4924,7 +5892,7 @@
                 <a:latin typeface="Comic Sans MS" pitchFamily="8" charset="0"/>
               </a:rPr>
               <a:pPr/>
-              <a:t>4</a:t>
+              <a:t>6</a:t>
             </a:fld>
             <a:endParaRPr lang="en-US" sz="1200" dirty="0" smtClean="0">
               <a:latin typeface="Comic Sans MS" pitchFamily="8" charset="0"/>
@@ -5324,6 +6292,9 @@
                     <p:cTn id="3" fill="hold">
                       <p:stCondLst>
                         <p:cond delay="indefinite"/>
+                        <p:cond evt="onBegin" delay="0">
+                          <p:tn val="2"/>
+                        </p:cond>
                       </p:stCondLst>
                       <p:childTnLst>
                         <p:par>
@@ -5333,9 +6304,9 @@
                             </p:stCondLst>
                             <p:childTnLst>
                               <p:par>
-                                <p:cTn id="5" presetID="9" presetClass="entr" presetSubtype="0" fill="hold" grpId="0" nodeType="clickEffect">
+                                <p:cTn id="5" presetID="23" presetClass="entr" presetSubtype="16" fill="hold" grpId="0" nodeType="afterEffect">
                                   <p:stCondLst>
-                                    <p:cond delay="0"/>
+                                    <p:cond delay="1000"/>
                                   </p:stCondLst>
                                   <p:childTnLst>
                                     <p:set>
@@ -5356,14 +6327,52 @@
                                         <p:strVal val="visible"/>
                                       </p:to>
                                     </p:set>
-                                    <p:animEffect transition="in" filter="dissolve">
+                                    <p:anim calcmode="lin" valueType="num">
                                       <p:cBhvr>
-                                        <p:cTn id="7" dur="1000"/>
+                                        <p:cTn id="7" dur="500" fill="hold"/>
                                         <p:tgtEl>
                                           <p:spTgt spid="8"/>
                                         </p:tgtEl>
+                                        <p:attrNameLst>
+                                          <p:attrName>ppt_w</p:attrName>
+                                        </p:attrNameLst>
                                       </p:cBhvr>
-                                    </p:animEffect>
+                                      <p:tavLst>
+                                        <p:tav tm="0">
+                                          <p:val>
+                                            <p:fltVal val="0"/>
+                                          </p:val>
+                                        </p:tav>
+                                        <p:tav tm="100000">
+                                          <p:val>
+                                            <p:strVal val="#ppt_w"/>
+                                          </p:val>
+                                        </p:tav>
+                                      </p:tavLst>
+                                    </p:anim>
+                                    <p:anim calcmode="lin" valueType="num">
+                                      <p:cBhvr>
+                                        <p:cTn id="8" dur="500" fill="hold"/>
+                                        <p:tgtEl>
+                                          <p:spTgt spid="8"/>
+                                        </p:tgtEl>
+                                        <p:attrNameLst>
+                                          <p:attrName>ppt_h</p:attrName>
+                                        </p:attrNameLst>
+                                      </p:cBhvr>
+                                      <p:tavLst>
+                                        <p:tav tm="0">
+                                          <p:val>
+                                            <p:fltVal val="0"/>
+                                          </p:val>
+                                        </p:tav>
+                                        <p:tav tm="100000">
+                                          <p:val>
+                                            <p:strVal val="#ppt_h"/>
+                                          </p:val>
+                                        </p:tav>
+                                      </p:tavLst>
+                                    </p:anim>
                                   </p:childTnLst>
                                 </p:cTn>
                               </p:par>
@@ -5374,26 +6383,26 @@
                     </p:cTn>
                   </p:par>
                   <p:par>
-                    <p:cTn id="8" fill="hold">
+                    <p:cTn id="9" fill="hold">
                       <p:stCondLst>
                         <p:cond delay="indefinite"/>
                       </p:stCondLst>
                       <p:childTnLst>
                         <p:par>
-                          <p:cTn id="9" fill="hold">
+                          <p:cTn id="10" fill="hold">
                             <p:stCondLst>
                               <p:cond delay="0"/>
                             </p:stCondLst>
                             <p:childTnLst>
                               <p:par>
-                                <p:cTn id="10" presetID="15" presetClass="entr" presetSubtype="0" fill="hold" grpId="0" nodeType="clickEffect">
+                                <p:cTn id="11" presetID="15" presetClass="entr" presetSubtype="0" fill="hold" grpId="0" nodeType="clickEffect">
                                   <p:stCondLst>
                                     <p:cond delay="0"/>
                                   </p:stCondLst>
                                   <p:childTnLst>
                                     <p:set>
                                       <p:cBhvr>
-                                        <p:cTn id="11" dur="1" fill="hold">
+                                        <p:cTn id="12" dur="1" fill="hold">
                                           <p:stCondLst>
                                             <p:cond delay="0"/>
                                           </p:stCondLst>
@@ -5411,7 +6420,7 @@
                                     </p:set>
                                     <p:anim calcmode="lin" valueType="num">
                                       <p:cBhvr>
-                                        <p:cTn id="12" dur="1000" fill="hold"/>
+                                        <p:cTn id="13" dur="1000" fill="hold"/>
                                         <p:tgtEl>
                                           <p:spTgt spid="7"/>
                                         </p:tgtEl>
@@ -5434,7 +6443,7 @@
                                     </p:anim>
                                     <p:anim calcmode="lin" valueType="num">
                                       <p:cBhvr>
-                                        <p:cTn id="13" dur="1000" fill="hold"/>
+                                        <p:cTn id="14" dur="1000" fill="hold"/>
                                         <p:tgtEl>
                                           <p:spTgt spid="7"/>
                                         </p:tgtEl>
@@ -5457,7 +6466,7 @@
                                     </p:anim>
                                     <p:anim calcmode="lin" valueType="num">
                                       <p:cBhvr>
-                                        <p:cTn id="14" dur="1000" fill="hold"/>
+                                        <p:cTn id="15" dur="1000" fill="hold"/>
                                         <p:tgtEl>
                                           <p:spTgt spid="7"/>
                                         </p:tgtEl>
@@ -5480,7 +6489,7 @@
                                     </p:anim>
                                     <p:anim calcmode="lin" valueType="num">
                                       <p:cBhvr>
-                                        <p:cTn id="15" dur="1000" fill="hold"/>
+                                        <p:cTn id="16" dur="1000" fill="hold"/>
                                         <p:tgtEl>
                                           <p:spTgt spid="7"/>
                                         </p:tgtEl>
@@ -5539,7 +6548,7 @@
 </p:sld>
 </file>
 
-<file path=ppt/slides/slide5.xml><?xml version="1.0" encoding="utf-8"?>
+<file path=ppt/slides/slide7.xml><?xml version="1.0" encoding="utf-8"?>
 <p:sld xmlns:a="http://schemas.openxmlformats.org/drawingml/2006/main" xmlns:r="http://schemas.openxmlformats.org/officeDocument/2006/relationships" xmlns:p="http://schemas.openxmlformats.org/presentationml/2006/main">
   <p:cSld>
     <p:spTree>
@@ -5911,7 +6920,7 @@
                 <a:latin typeface="Comic Sans MS" pitchFamily="8" charset="0"/>
               </a:rPr>
               <a:pPr/>
-              <a:t>5</a:t>
+              <a:t>7</a:t>
             </a:fld>
             <a:endParaRPr lang="en-US" sz="1200" dirty="0" smtClean="0">
               <a:latin typeface="Comic Sans MS" pitchFamily="8" charset="0"/>

</xml_diff>